<commit_message>
updated with gabriel's changes
</commit_message>
<xml_diff>
--- a/documentation/specifications/GRÖNDOM_Präsentation.pptx
+++ b/documentation/specifications/GRÖNDOM_Präsentation.pptx
@@ -21,7 +21,7 @@
     <p:sldId id="272" r:id="rId12"/>
     <p:sldId id="297" r:id="rId13"/>
     <p:sldId id="283" r:id="rId14"/>
-    <p:sldId id="299" r:id="rId15"/>
+    <p:sldId id="300" r:id="rId15"/>
     <p:sldId id="293" r:id="rId16"/>
     <p:sldId id="298" r:id="rId17"/>
     <p:sldId id="290" r:id="rId18"/>
@@ -533,141 +533,7 @@
           <a:bodyPr/>
           <a:lstStyle/>
           <a:p>
-            <a:r>
-              <a:rPr lang="de-DE" sz="1200" kern="1200" dirty="0" smtClean="0">
-                <a:solidFill>
-                  <a:schemeClr val="tx1"/>
-                </a:solidFill>
-                <a:effectLst/>
-                <a:latin typeface="+mn-lt"/>
-                <a:ea typeface="+mn-ea"/>
-                <a:cs typeface="+mn-cs"/>
-              </a:rPr>
-              <a:t>Eine Android App soll es Benutzern erlauben, mit anderen Personen zu chatten. Der ganze Chat ist anonym, das </a:t>
-            </a:r>
-            <a:r>
-              <a:rPr lang="de-DE" sz="1200" kern="1200" dirty="0" err="1" smtClean="0">
-                <a:solidFill>
-                  <a:schemeClr val="tx1"/>
-                </a:solidFill>
-                <a:effectLst/>
-                <a:latin typeface="+mn-lt"/>
-                <a:ea typeface="+mn-ea"/>
-                <a:cs typeface="+mn-cs"/>
-              </a:rPr>
-              <a:t>heisst</a:t>
-            </a:r>
-            <a:r>
-              <a:rPr lang="de-DE" sz="1200" kern="1200" dirty="0" smtClean="0">
-                <a:solidFill>
-                  <a:schemeClr val="tx1"/>
-                </a:solidFill>
-                <a:effectLst/>
-                <a:latin typeface="+mn-lt"/>
-                <a:ea typeface="+mn-ea"/>
-                <a:cs typeface="+mn-cs"/>
-              </a:rPr>
-              <a:t> es werden keinerlei Informationen </a:t>
-            </a:r>
-            <a:r>
-              <a:rPr lang="de-DE" sz="1200" kern="1200" dirty="0" err="1" smtClean="0">
-                <a:solidFill>
-                  <a:schemeClr val="tx1"/>
-                </a:solidFill>
-                <a:effectLst/>
-                <a:latin typeface="+mn-lt"/>
-                <a:ea typeface="+mn-ea"/>
-                <a:cs typeface="+mn-cs"/>
-              </a:rPr>
-              <a:t>über</a:t>
-            </a:r>
-            <a:r>
-              <a:rPr lang="de-DE" sz="1200" kern="1200" dirty="0" smtClean="0">
-                <a:solidFill>
-                  <a:schemeClr val="tx1"/>
-                </a:solidFill>
-                <a:effectLst/>
-                <a:latin typeface="+mn-lt"/>
-                <a:ea typeface="+mn-ea"/>
-                <a:cs typeface="+mn-cs"/>
-              </a:rPr>
-              <a:t> die andere Person preisgegeben. Der Chat wird nirgendwo gespeichert und existiert nur so lange wie die Chat Session offen ist. Man wird </a:t>
-            </a:r>
-            <a:r>
-              <a:rPr lang="de-DE" sz="1200" kern="1200" dirty="0" err="1" smtClean="0">
-                <a:solidFill>
-                  <a:schemeClr val="tx1"/>
-                </a:solidFill>
-                <a:effectLst/>
-                <a:latin typeface="+mn-lt"/>
-                <a:ea typeface="+mn-ea"/>
-                <a:cs typeface="+mn-cs"/>
-              </a:rPr>
-              <a:t>willkürlich</a:t>
-            </a:r>
-            <a:r>
-              <a:rPr lang="de-DE" sz="1200" kern="1200" dirty="0" smtClean="0">
-                <a:solidFill>
-                  <a:schemeClr val="tx1"/>
-                </a:solidFill>
-                <a:effectLst/>
-                <a:latin typeface="+mn-lt"/>
-                <a:ea typeface="+mn-ea"/>
-                <a:cs typeface="+mn-cs"/>
-              </a:rPr>
-              <a:t> mit einem anderen User verbunden, er gerade online ist.</a:t>
-            </a:r>
-          </a:p>
-          <a:p>
-            <a:endParaRPr lang="de-DE" sz="1200" kern="1200" dirty="0" smtClean="0">
-              <a:solidFill>
-                <a:schemeClr val="tx1"/>
-              </a:solidFill>
-              <a:effectLst/>
-              <a:latin typeface="+mn-lt"/>
-              <a:ea typeface="+mn-ea"/>
-              <a:cs typeface="+mn-cs"/>
-            </a:endParaRPr>
-          </a:p>
-          <a:p>
-            <a:r>
-              <a:rPr lang="de-DE" sz="1200" kern="1200" dirty="0" smtClean="0">
-                <a:solidFill>
-                  <a:schemeClr val="tx1"/>
-                </a:solidFill>
-                <a:effectLst/>
-                <a:latin typeface="+mn-lt"/>
-                <a:ea typeface="+mn-ea"/>
-                <a:cs typeface="+mn-cs"/>
-                <a:sym typeface="Wingdings"/>
-              </a:rPr>
-              <a:t> </a:t>
-            </a:r>
-            <a:r>
-              <a:rPr lang="de-DE" sz="1200" kern="1200" dirty="0" smtClean="0">
-                <a:solidFill>
-                  <a:schemeClr val="tx1"/>
-                </a:solidFill>
-                <a:effectLst/>
-                <a:latin typeface="+mn-lt"/>
-                <a:ea typeface="+mn-ea"/>
-                <a:cs typeface="+mn-cs"/>
-              </a:rPr>
-              <a:t>Keine</a:t>
-            </a:r>
-            <a:r>
-              <a:rPr lang="de-DE" sz="1200" kern="1200" baseline="0" dirty="0" smtClean="0">
-                <a:solidFill>
-                  <a:schemeClr val="tx1"/>
-                </a:solidFill>
-                <a:effectLst/>
-                <a:latin typeface="+mn-lt"/>
-                <a:ea typeface="+mn-ea"/>
-                <a:cs typeface="+mn-cs"/>
-              </a:rPr>
-              <a:t> Registrierung nötig</a:t>
-            </a:r>
-            <a:endParaRPr lang="de-DE" dirty="0"/>
+            <a:endParaRPr lang="de-DE" baseline="0" dirty="0" smtClean="0"/>
           </a:p>
         </p:txBody>
       </p:sp>
@@ -688,7 +554,7 @@
           <a:p>
             <a:fld id="{63FB81A6-A126-4AE4-9837-D28ACE5F3209}" type="slidenum">
               <a:rPr lang="de-CH" smtClean="0"/>
-              <a:t>3</a:t>
+              <a:t>1</a:t>
             </a:fld>
             <a:endParaRPr lang="de-CH"/>
           </a:p>
@@ -697,7 +563,7 @@
     </p:spTree>
     <p:extLst>
       <p:ext uri="{BB962C8B-B14F-4D97-AF65-F5344CB8AC3E}">
-        <p14:creationId xmlns:p14="http://schemas.microsoft.com/office/powerpoint/2010/main" val="521550805"/>
+        <p14:creationId xmlns:p14="http://schemas.microsoft.com/office/powerpoint/2010/main" val="1707806092"/>
       </p:ext>
     </p:extLst>
   </p:cSld>
@@ -772,7 +638,7 @@
           <a:p>
             <a:fld id="{63FB81A6-A126-4AE4-9837-D28ACE5F3209}" type="slidenum">
               <a:rPr lang="de-CH" smtClean="0"/>
-              <a:t>14</a:t>
+              <a:t>12</a:t>
             </a:fld>
             <a:endParaRPr lang="de-CH"/>
           </a:p>
@@ -781,7 +647,7 @@
     </p:spTree>
     <p:extLst>
       <p:ext uri="{BB962C8B-B14F-4D97-AF65-F5344CB8AC3E}">
-        <p14:creationId xmlns:p14="http://schemas.microsoft.com/office/powerpoint/2010/main" val="101183318"/>
+        <p14:creationId xmlns:p14="http://schemas.microsoft.com/office/powerpoint/2010/main" val="1032840274"/>
       </p:ext>
     </p:extLst>
   </p:cSld>
@@ -856,6 +722,212 @@
           <a:p>
             <a:fld id="{63FB81A6-A126-4AE4-9837-D28ACE5F3209}" type="slidenum">
               <a:rPr lang="de-CH" smtClean="0"/>
+              <a:t>13</a:t>
+            </a:fld>
+            <a:endParaRPr lang="de-CH"/>
+          </a:p>
+        </p:txBody>
+      </p:sp>
+    </p:spTree>
+    <p:extLst>
+      <p:ext uri="{BB962C8B-B14F-4D97-AF65-F5344CB8AC3E}">
+        <p14:creationId xmlns:p14="http://schemas.microsoft.com/office/powerpoint/2010/main" val="363853394"/>
+      </p:ext>
+    </p:extLst>
+  </p:cSld>
+  <p:clrMapOvr>
+    <a:masterClrMapping/>
+  </p:clrMapOvr>
+</p:notes>
+</file>
+
+<file path=ppt/notesSlides/notesSlide12.xml><?xml version="1.0" encoding="utf-8"?>
+<p:notes xmlns:a="http://schemas.openxmlformats.org/drawingml/2006/main" xmlns:r="http://schemas.openxmlformats.org/officeDocument/2006/relationships" xmlns:p="http://schemas.openxmlformats.org/presentationml/2006/main">
+  <p:cSld>
+    <p:spTree>
+      <p:nvGrpSpPr>
+        <p:cNvPr id="1" name=""/>
+        <p:cNvGrpSpPr/>
+        <p:nvPr/>
+      </p:nvGrpSpPr>
+      <p:grpSpPr>
+        <a:xfrm>
+          <a:off x="0" y="0"/>
+          <a:ext cx="0" cy="0"/>
+          <a:chOff x="0" y="0"/>
+          <a:chExt cx="0" cy="0"/>
+        </a:xfrm>
+      </p:grpSpPr>
+      <p:sp>
+        <p:nvSpPr>
+          <p:cNvPr id="2" name="Folienbildplatzhalter 1"/>
+          <p:cNvSpPr>
+            <a:spLocks noGrp="1" noRot="1" noChangeAspect="1"/>
+          </p:cNvSpPr>
+          <p:nvPr>
+            <p:ph type="sldImg"/>
+          </p:nvPr>
+        </p:nvSpPr>
+        <p:spPr/>
+      </p:sp>
+      <p:sp>
+        <p:nvSpPr>
+          <p:cNvPr id="3" name="Notizenplatzhalter 2"/>
+          <p:cNvSpPr>
+            <a:spLocks noGrp="1"/>
+          </p:cNvSpPr>
+          <p:nvPr>
+            <p:ph type="body" idx="1"/>
+          </p:nvPr>
+        </p:nvSpPr>
+        <p:spPr/>
+        <p:txBody>
+          <a:bodyPr/>
+          <a:lstStyle/>
+          <a:p>
+            <a:pPr marL="0" marR="0" indent="0" algn="l" defTabSz="914400" rtl="0" eaLnBrk="1" fontAlgn="auto" latinLnBrk="0" hangingPunct="1">
+              <a:lnSpc>
+                <a:spcPct val="100000"/>
+              </a:lnSpc>
+              <a:spcBef>
+                <a:spcPts val="0"/>
+              </a:spcBef>
+              <a:spcAft>
+                <a:spcPts val="0"/>
+              </a:spcAft>
+              <a:buClrTx/>
+              <a:buSzTx/>
+              <a:buFontTx/>
+              <a:buNone/>
+              <a:tabLst/>
+              <a:defRPr/>
+            </a:pPr>
+            <a:r>
+              <a:rPr lang="de-DE" dirty="0" smtClean="0">
+                <a:sym typeface="Wingdings"/>
+              </a:rPr>
+              <a:t> </a:t>
+            </a:r>
+            <a:r>
+              <a:rPr lang="de-DE" dirty="0" smtClean="0"/>
+              <a:t>Was ist</a:t>
+            </a:r>
+            <a:r>
+              <a:rPr lang="de-DE" baseline="0" dirty="0" smtClean="0"/>
+              <a:t> Travis und </a:t>
+            </a:r>
+            <a:r>
+              <a:rPr lang="de-DE" baseline="0" dirty="0" err="1" smtClean="0"/>
+              <a:t>Continous</a:t>
+            </a:r>
+            <a:r>
+              <a:rPr lang="de-DE" baseline="0" dirty="0" smtClean="0"/>
+              <a:t> Integration?</a:t>
+            </a:r>
+          </a:p>
+        </p:txBody>
+      </p:sp>
+      <p:sp>
+        <p:nvSpPr>
+          <p:cNvPr id="4" name="Foliennummernplatzhalter 3"/>
+          <p:cNvSpPr>
+            <a:spLocks noGrp="1"/>
+          </p:cNvSpPr>
+          <p:nvPr>
+            <p:ph type="sldNum" sz="quarter" idx="10"/>
+          </p:nvPr>
+        </p:nvSpPr>
+        <p:spPr/>
+        <p:txBody>
+          <a:bodyPr/>
+          <a:lstStyle/>
+          <a:p>
+            <a:fld id="{63FB81A6-A126-4AE4-9837-D28ACE5F3209}" type="slidenum">
+              <a:rPr lang="de-CH" smtClean="0"/>
+              <a:t>14</a:t>
+            </a:fld>
+            <a:endParaRPr lang="de-CH"/>
+          </a:p>
+        </p:txBody>
+      </p:sp>
+    </p:spTree>
+    <p:extLst>
+      <p:ext uri="{BB962C8B-B14F-4D97-AF65-F5344CB8AC3E}">
+        <p14:creationId xmlns:p14="http://schemas.microsoft.com/office/powerpoint/2010/main" val="1626603160"/>
+      </p:ext>
+    </p:extLst>
+  </p:cSld>
+  <p:clrMapOvr>
+    <a:masterClrMapping/>
+  </p:clrMapOvr>
+</p:notes>
+</file>
+
+<file path=ppt/notesSlides/notesSlide13.xml><?xml version="1.0" encoding="utf-8"?>
+<p:notes xmlns:a="http://schemas.openxmlformats.org/drawingml/2006/main" xmlns:r="http://schemas.openxmlformats.org/officeDocument/2006/relationships" xmlns:p="http://schemas.openxmlformats.org/presentationml/2006/main">
+  <p:cSld>
+    <p:spTree>
+      <p:nvGrpSpPr>
+        <p:cNvPr id="1" name=""/>
+        <p:cNvGrpSpPr/>
+        <p:nvPr/>
+      </p:nvGrpSpPr>
+      <p:grpSpPr>
+        <a:xfrm>
+          <a:off x="0" y="0"/>
+          <a:ext cx="0" cy="0"/>
+          <a:chOff x="0" y="0"/>
+          <a:chExt cx="0" cy="0"/>
+        </a:xfrm>
+      </p:grpSpPr>
+      <p:sp>
+        <p:nvSpPr>
+          <p:cNvPr id="2" name="Folienbildplatzhalter 1"/>
+          <p:cNvSpPr>
+            <a:spLocks noGrp="1" noRot="1" noChangeAspect="1"/>
+          </p:cNvSpPr>
+          <p:nvPr>
+            <p:ph type="sldImg"/>
+          </p:nvPr>
+        </p:nvSpPr>
+        <p:spPr/>
+      </p:sp>
+      <p:sp>
+        <p:nvSpPr>
+          <p:cNvPr id="3" name="Notizenplatzhalter 2"/>
+          <p:cNvSpPr>
+            <a:spLocks noGrp="1"/>
+          </p:cNvSpPr>
+          <p:nvPr>
+            <p:ph type="body" idx="1"/>
+          </p:nvPr>
+        </p:nvSpPr>
+        <p:spPr/>
+        <p:txBody>
+          <a:bodyPr/>
+          <a:lstStyle/>
+          <a:p>
+            <a:endParaRPr lang="de-DE" dirty="0"/>
+          </a:p>
+        </p:txBody>
+      </p:sp>
+      <p:sp>
+        <p:nvSpPr>
+          <p:cNvPr id="4" name="Foliennummernplatzhalter 3"/>
+          <p:cNvSpPr>
+            <a:spLocks noGrp="1"/>
+          </p:cNvSpPr>
+          <p:nvPr>
+            <p:ph type="sldNum" sz="quarter" idx="10"/>
+          </p:nvPr>
+        </p:nvSpPr>
+        <p:spPr/>
+        <p:txBody>
+          <a:bodyPr/>
+          <a:lstStyle/>
+          <a:p>
+            <a:fld id="{63FB81A6-A126-4AE4-9837-D28ACE5F3209}" type="slidenum">
+              <a:rPr lang="de-CH" smtClean="0"/>
               <a:t>15</a:t>
             </a:fld>
             <a:endParaRPr lang="de-CH"/>
@@ -875,7 +947,7 @@
 </p:notes>
 </file>
 
-<file path=ppt/notesSlides/notesSlide12.xml><?xml version="1.0" encoding="utf-8"?>
+<file path=ppt/notesSlides/notesSlide14.xml><?xml version="1.0" encoding="utf-8"?>
 <p:notes xmlns:a="http://schemas.openxmlformats.org/drawingml/2006/main" xmlns:r="http://schemas.openxmlformats.org/officeDocument/2006/relationships" xmlns:p="http://schemas.openxmlformats.org/presentationml/2006/main">
   <p:cSld>
     <p:spTree>
@@ -1004,12 +1076,138 @@
           <a:lstStyle/>
           <a:p>
             <a:r>
-              <a:rPr lang="de-DE" dirty="0" smtClean="0"/>
-              <a:t>Heutige</a:t>
-            </a:r>
-            <a:r>
-              <a:rPr lang="de-DE" baseline="0" dirty="0" smtClean="0"/>
-              <a:t> Zeit: Alle Sammeln Daten und erstellen Nutzerprofile</a:t>
+              <a:rPr lang="de-DE" sz="1200" kern="1200" dirty="0" smtClean="0">
+                <a:solidFill>
+                  <a:schemeClr val="tx1"/>
+                </a:solidFill>
+                <a:effectLst/>
+                <a:latin typeface="+mn-lt"/>
+                <a:ea typeface="+mn-ea"/>
+                <a:cs typeface="+mn-cs"/>
+              </a:rPr>
+              <a:t>Eine Android App soll es Benutzern erlauben, mit anderen Personen zu chatten. Der ganze Chat ist anonym, das </a:t>
+            </a:r>
+            <a:r>
+              <a:rPr lang="de-DE" sz="1200" kern="1200" dirty="0" err="1" smtClean="0">
+                <a:solidFill>
+                  <a:schemeClr val="tx1"/>
+                </a:solidFill>
+                <a:effectLst/>
+                <a:latin typeface="+mn-lt"/>
+                <a:ea typeface="+mn-ea"/>
+                <a:cs typeface="+mn-cs"/>
+              </a:rPr>
+              <a:t>heisst</a:t>
+            </a:r>
+            <a:r>
+              <a:rPr lang="de-DE" sz="1200" kern="1200" dirty="0" smtClean="0">
+                <a:solidFill>
+                  <a:schemeClr val="tx1"/>
+                </a:solidFill>
+                <a:effectLst/>
+                <a:latin typeface="+mn-lt"/>
+                <a:ea typeface="+mn-ea"/>
+                <a:cs typeface="+mn-cs"/>
+              </a:rPr>
+              <a:t> es werden keinerlei Informationen </a:t>
+            </a:r>
+            <a:r>
+              <a:rPr lang="de-DE" sz="1200" kern="1200" dirty="0" err="1" smtClean="0">
+                <a:solidFill>
+                  <a:schemeClr val="tx1"/>
+                </a:solidFill>
+                <a:effectLst/>
+                <a:latin typeface="+mn-lt"/>
+                <a:ea typeface="+mn-ea"/>
+                <a:cs typeface="+mn-cs"/>
+              </a:rPr>
+              <a:t>über</a:t>
+            </a:r>
+            <a:r>
+              <a:rPr lang="de-DE" sz="1200" kern="1200" dirty="0" smtClean="0">
+                <a:solidFill>
+                  <a:schemeClr val="tx1"/>
+                </a:solidFill>
+                <a:effectLst/>
+                <a:latin typeface="+mn-lt"/>
+                <a:ea typeface="+mn-ea"/>
+                <a:cs typeface="+mn-cs"/>
+              </a:rPr>
+              <a:t> die andere Person preisgegeben. Der Chat wird nirgendwo gespeichert und existiert nur so lange wie die Chat Session offen ist. Man wird </a:t>
+            </a:r>
+            <a:r>
+              <a:rPr lang="de-DE" sz="1200" kern="1200" dirty="0" err="1" smtClean="0">
+                <a:solidFill>
+                  <a:schemeClr val="tx1"/>
+                </a:solidFill>
+                <a:effectLst/>
+                <a:latin typeface="+mn-lt"/>
+                <a:ea typeface="+mn-ea"/>
+                <a:cs typeface="+mn-cs"/>
+              </a:rPr>
+              <a:t>willkürlich</a:t>
+            </a:r>
+            <a:r>
+              <a:rPr lang="de-DE" sz="1200" kern="1200" dirty="0" smtClean="0">
+                <a:solidFill>
+                  <a:schemeClr val="tx1"/>
+                </a:solidFill>
+                <a:effectLst/>
+                <a:latin typeface="+mn-lt"/>
+                <a:ea typeface="+mn-ea"/>
+                <a:cs typeface="+mn-cs"/>
+              </a:rPr>
+              <a:t> mit einem anderen User verbunden, er gerade online ist.</a:t>
+            </a:r>
+          </a:p>
+          <a:p>
+            <a:endParaRPr lang="de-DE" sz="1200" kern="1200" dirty="0" smtClean="0">
+              <a:solidFill>
+                <a:schemeClr val="tx1"/>
+              </a:solidFill>
+              <a:effectLst/>
+              <a:latin typeface="+mn-lt"/>
+              <a:ea typeface="+mn-ea"/>
+              <a:cs typeface="+mn-cs"/>
+            </a:endParaRPr>
+          </a:p>
+          <a:p>
+            <a:r>
+              <a:rPr lang="de-DE" sz="1200" kern="1200" dirty="0" smtClean="0">
+                <a:solidFill>
+                  <a:schemeClr val="tx1"/>
+                </a:solidFill>
+                <a:effectLst/>
+                <a:latin typeface="+mn-lt"/>
+                <a:ea typeface="+mn-ea"/>
+                <a:cs typeface="+mn-cs"/>
+                <a:sym typeface="Wingdings"/>
+              </a:rPr>
+              <a:t> </a:t>
+            </a:r>
+            <a:r>
+              <a:rPr lang="de-DE" sz="1200" kern="1200" dirty="0" smtClean="0">
+                <a:solidFill>
+                  <a:schemeClr val="tx1"/>
+                </a:solidFill>
+                <a:effectLst/>
+                <a:latin typeface="+mn-lt"/>
+                <a:ea typeface="+mn-ea"/>
+                <a:cs typeface="+mn-cs"/>
+              </a:rPr>
+              <a:t>Keine</a:t>
+            </a:r>
+            <a:r>
+              <a:rPr lang="de-DE" sz="1200" kern="1200" baseline="0" dirty="0" smtClean="0">
+                <a:solidFill>
+                  <a:schemeClr val="tx1"/>
+                </a:solidFill>
+                <a:effectLst/>
+                <a:latin typeface="+mn-lt"/>
+                <a:ea typeface="+mn-ea"/>
+                <a:cs typeface="+mn-cs"/>
+              </a:rPr>
+              <a:t> Registrierung nötig</a:t>
             </a:r>
             <a:endParaRPr lang="de-DE" dirty="0"/>
           </a:p>
@@ -1032,7 +1230,7 @@
           <a:p>
             <a:fld id="{63FB81A6-A126-4AE4-9837-D28ACE5F3209}" type="slidenum">
               <a:rPr lang="de-CH" smtClean="0"/>
-              <a:t>4</a:t>
+              <a:t>3</a:t>
             </a:fld>
             <a:endParaRPr lang="de-CH"/>
           </a:p>
@@ -1041,7 +1239,7 @@
     </p:spTree>
     <p:extLst>
       <p:ext uri="{BB962C8B-B14F-4D97-AF65-F5344CB8AC3E}">
-        <p14:creationId xmlns:p14="http://schemas.microsoft.com/office/powerpoint/2010/main" val="563568474"/>
+        <p14:creationId xmlns:p14="http://schemas.microsoft.com/office/powerpoint/2010/main" val="521550805"/>
       </p:ext>
     </p:extLst>
   </p:cSld>
@@ -1095,7 +1293,15 @@
           <a:bodyPr/>
           <a:lstStyle/>
           <a:p>
-            <a:endParaRPr lang="de-CH" dirty="0"/>
+            <a:r>
+              <a:rPr lang="de-DE" dirty="0" smtClean="0"/>
+              <a:t>Heutige</a:t>
+            </a:r>
+            <a:r>
+              <a:rPr lang="de-DE" baseline="0" dirty="0" smtClean="0"/>
+              <a:t> Zeit: Alle Sammeln Daten und erstellen Nutzerprofile</a:t>
+            </a:r>
+            <a:endParaRPr lang="de-DE" dirty="0"/>
           </a:p>
         </p:txBody>
       </p:sp>
@@ -1116,7 +1322,7 @@
           <a:p>
             <a:fld id="{63FB81A6-A126-4AE4-9837-D28ACE5F3209}" type="slidenum">
               <a:rPr lang="de-CH" smtClean="0"/>
-              <a:t>6</a:t>
+              <a:t>4</a:t>
             </a:fld>
             <a:endParaRPr lang="de-CH"/>
           </a:p>
@@ -1125,7 +1331,7 @@
     </p:spTree>
     <p:extLst>
       <p:ext uri="{BB962C8B-B14F-4D97-AF65-F5344CB8AC3E}">
-        <p14:creationId xmlns:p14="http://schemas.microsoft.com/office/powerpoint/2010/main" val="2838052124"/>
+        <p14:creationId xmlns:p14="http://schemas.microsoft.com/office/powerpoint/2010/main" val="563568474"/>
       </p:ext>
     </p:extLst>
   </p:cSld>
@@ -1200,7 +1406,7 @@
           <a:p>
             <a:fld id="{63FB81A6-A126-4AE4-9837-D28ACE5F3209}" type="slidenum">
               <a:rPr lang="de-CH" smtClean="0"/>
-              <a:t>7</a:t>
+              <a:t>6</a:t>
             </a:fld>
             <a:endParaRPr lang="de-CH"/>
           </a:p>
@@ -1209,7 +1415,7 @@
     </p:spTree>
     <p:extLst>
       <p:ext uri="{BB962C8B-B14F-4D97-AF65-F5344CB8AC3E}">
-        <p14:creationId xmlns:p14="http://schemas.microsoft.com/office/powerpoint/2010/main" val="4139007739"/>
+        <p14:creationId xmlns:p14="http://schemas.microsoft.com/office/powerpoint/2010/main" val="2838052124"/>
       </p:ext>
     </p:extLst>
   </p:cSld>
@@ -1284,7 +1490,7 @@
           <a:p>
             <a:fld id="{63FB81A6-A126-4AE4-9837-D28ACE5F3209}" type="slidenum">
               <a:rPr lang="de-CH" smtClean="0"/>
-              <a:t>8</a:t>
+              <a:t>7</a:t>
             </a:fld>
             <a:endParaRPr lang="de-CH"/>
           </a:p>
@@ -1293,7 +1499,7 @@
     </p:spTree>
     <p:extLst>
       <p:ext uri="{BB962C8B-B14F-4D97-AF65-F5344CB8AC3E}">
-        <p14:creationId xmlns:p14="http://schemas.microsoft.com/office/powerpoint/2010/main" val="1503965133"/>
+        <p14:creationId xmlns:p14="http://schemas.microsoft.com/office/powerpoint/2010/main" val="4139007739"/>
       </p:ext>
     </p:extLst>
   </p:cSld>
@@ -1347,24 +1553,7 @@
           <a:bodyPr/>
           <a:lstStyle/>
           <a:p>
-            <a:pPr marL="0" marR="0" lvl="0" indent="0" algn="l" defTabSz="914400" rtl="0" eaLnBrk="1" fontAlgn="auto" latinLnBrk="0" hangingPunct="1">
-              <a:lnSpc>
-                <a:spcPct val="100000"/>
-              </a:lnSpc>
-              <a:spcBef>
-                <a:spcPts val="0"/>
-              </a:spcBef>
-              <a:spcAft>
-                <a:spcPts val="0"/>
-              </a:spcAft>
-              <a:buClrTx/>
-              <a:buSzTx/>
-              <a:buFontTx/>
-              <a:buNone/>
-              <a:tabLst/>
-              <a:defRPr/>
-            </a:pPr>
-            <a:endParaRPr lang="de-CH" dirty="0" smtClean="0"/>
+            <a:endParaRPr lang="de-CH" dirty="0"/>
           </a:p>
         </p:txBody>
       </p:sp>
@@ -1385,7 +1574,7 @@
           <a:p>
             <a:fld id="{63FB81A6-A126-4AE4-9837-D28ACE5F3209}" type="slidenum">
               <a:rPr lang="de-CH" smtClean="0"/>
-              <a:t>9</a:t>
+              <a:t>8</a:t>
             </a:fld>
             <a:endParaRPr lang="de-CH"/>
           </a:p>
@@ -1394,7 +1583,7 @@
     </p:spTree>
     <p:extLst>
       <p:ext uri="{BB962C8B-B14F-4D97-AF65-F5344CB8AC3E}">
-        <p14:creationId xmlns:p14="http://schemas.microsoft.com/office/powerpoint/2010/main" val="440940252"/>
+        <p14:creationId xmlns:p14="http://schemas.microsoft.com/office/powerpoint/2010/main" val="1503965133"/>
       </p:ext>
     </p:extLst>
   </p:cSld>
@@ -1465,7 +1654,7 @@
               <a:tabLst/>
               <a:defRPr/>
             </a:pPr>
-            <a:endParaRPr lang="de-CH" dirty="0"/>
+            <a:endParaRPr lang="de-CH" dirty="0" smtClean="0"/>
           </a:p>
         </p:txBody>
       </p:sp>
@@ -1486,7 +1675,7 @@
           <a:p>
             <a:fld id="{63FB81A6-A126-4AE4-9837-D28ACE5F3209}" type="slidenum">
               <a:rPr lang="de-CH" smtClean="0"/>
-              <a:t>10</a:t>
+              <a:t>9</a:t>
             </a:fld>
             <a:endParaRPr lang="de-CH"/>
           </a:p>
@@ -1495,7 +1684,7 @@
     </p:spTree>
     <p:extLst>
       <p:ext uri="{BB962C8B-B14F-4D97-AF65-F5344CB8AC3E}">
-        <p14:creationId xmlns:p14="http://schemas.microsoft.com/office/powerpoint/2010/main" val="1197870622"/>
+        <p14:creationId xmlns:p14="http://schemas.microsoft.com/office/powerpoint/2010/main" val="440940252"/>
       </p:ext>
     </p:extLst>
   </p:cSld>
@@ -1549,7 +1738,24 @@
           <a:bodyPr/>
           <a:lstStyle/>
           <a:p>
-            <a:endParaRPr lang="de-DE" dirty="0"/>
+            <a:pPr marL="0" marR="0" lvl="0" indent="0" algn="l" defTabSz="914400" rtl="0" eaLnBrk="1" fontAlgn="auto" latinLnBrk="0" hangingPunct="1">
+              <a:lnSpc>
+                <a:spcPct val="100000"/>
+              </a:lnSpc>
+              <a:spcBef>
+                <a:spcPts val="0"/>
+              </a:spcBef>
+              <a:spcAft>
+                <a:spcPts val="0"/>
+              </a:spcAft>
+              <a:buClrTx/>
+              <a:buSzTx/>
+              <a:buFontTx/>
+              <a:buNone/>
+              <a:tabLst/>
+              <a:defRPr/>
+            </a:pPr>
+            <a:endParaRPr lang="de-CH" dirty="0"/>
           </a:p>
         </p:txBody>
       </p:sp>
@@ -1570,7 +1776,7 @@
           <a:p>
             <a:fld id="{63FB81A6-A126-4AE4-9837-D28ACE5F3209}" type="slidenum">
               <a:rPr lang="de-CH" smtClean="0"/>
-              <a:t>12</a:t>
+              <a:t>10</a:t>
             </a:fld>
             <a:endParaRPr lang="de-CH"/>
           </a:p>
@@ -1579,7 +1785,7 @@
     </p:spTree>
     <p:extLst>
       <p:ext uri="{BB962C8B-B14F-4D97-AF65-F5344CB8AC3E}">
-        <p14:creationId xmlns:p14="http://schemas.microsoft.com/office/powerpoint/2010/main" val="1032840274"/>
+        <p14:creationId xmlns:p14="http://schemas.microsoft.com/office/powerpoint/2010/main" val="1197870622"/>
       </p:ext>
     </p:extLst>
   </p:cSld>
@@ -1633,7 +1839,11 @@
           <a:bodyPr/>
           <a:lstStyle/>
           <a:p>
-            <a:endParaRPr lang="de-DE" dirty="0"/>
+            <a:r>
+              <a:rPr lang="de-DE" smtClean="0"/>
+              <a:t>Richtig so?</a:t>
+            </a:r>
+            <a:endParaRPr lang="de-DE"/>
           </a:p>
         </p:txBody>
       </p:sp>
@@ -1654,7 +1864,7 @@
           <a:p>
             <a:fld id="{63FB81A6-A126-4AE4-9837-D28ACE5F3209}" type="slidenum">
               <a:rPr lang="de-CH" smtClean="0"/>
-              <a:t>13</a:t>
+              <a:t>11</a:t>
             </a:fld>
             <a:endParaRPr lang="de-CH"/>
           </a:p>
@@ -1663,7 +1873,7 @@
     </p:spTree>
     <p:extLst>
       <p:ext uri="{BB962C8B-B14F-4D97-AF65-F5344CB8AC3E}">
-        <p14:creationId xmlns:p14="http://schemas.microsoft.com/office/powerpoint/2010/main" val="363853394"/>
+        <p14:creationId xmlns:p14="http://schemas.microsoft.com/office/powerpoint/2010/main" val="1104521478"/>
       </p:ext>
     </p:extLst>
   </p:cSld>
@@ -1695,7 +1905,7 @@
           <p:cNvPr id="2" name="Titel 1">
             <a:extLst>
               <a:ext uri="{FF2B5EF4-FFF2-40B4-BE49-F238E27FC236}">
-                <a16:creationId xmlns:a16="http://schemas.microsoft.com/office/drawing/2014/main" xmlns="" id="{5B82C4DB-B764-478E-870D-214122C59920}"/>
+                <a16:creationId xmlns="" xmlns:a16="http://schemas.microsoft.com/office/drawing/2014/main" id="{5B82C4DB-B764-478E-870D-214122C59920}"/>
               </a:ext>
             </a:extLst>
           </p:cNvPr>
@@ -1733,7 +1943,7 @@
           <p:cNvPr id="3" name="Untertitel 2">
             <a:extLst>
               <a:ext uri="{FF2B5EF4-FFF2-40B4-BE49-F238E27FC236}">
-                <a16:creationId xmlns:a16="http://schemas.microsoft.com/office/drawing/2014/main" xmlns="" id="{BA0AB10A-ED1E-4150-AA82-BF4198797245}"/>
+                <a16:creationId xmlns="" xmlns:a16="http://schemas.microsoft.com/office/drawing/2014/main" id="{BA0AB10A-ED1E-4150-AA82-BF4198797245}"/>
               </a:ext>
             </a:extLst>
           </p:cNvPr>
@@ -1804,7 +2014,7 @@
           <p:cNvPr id="4" name="Datumsplatzhalter 3">
             <a:extLst>
               <a:ext uri="{FF2B5EF4-FFF2-40B4-BE49-F238E27FC236}">
-                <a16:creationId xmlns:a16="http://schemas.microsoft.com/office/drawing/2014/main" xmlns="" id="{064872E8-DE41-4C9E-BBAF-87E2367BBB0D}"/>
+                <a16:creationId xmlns="" xmlns:a16="http://schemas.microsoft.com/office/drawing/2014/main" id="{064872E8-DE41-4C9E-BBAF-87E2367BBB0D}"/>
               </a:ext>
             </a:extLst>
           </p:cNvPr>
@@ -1833,7 +2043,7 @@
           <p:cNvPr id="5" name="Fußzeilenplatzhalter 4">
             <a:extLst>
               <a:ext uri="{FF2B5EF4-FFF2-40B4-BE49-F238E27FC236}">
-                <a16:creationId xmlns:a16="http://schemas.microsoft.com/office/drawing/2014/main" xmlns="" id="{695BEE75-1DD6-4BBE-8E44-FA89616C6CF7}"/>
+                <a16:creationId xmlns="" xmlns:a16="http://schemas.microsoft.com/office/drawing/2014/main" id="{695BEE75-1DD6-4BBE-8E44-FA89616C6CF7}"/>
               </a:ext>
             </a:extLst>
           </p:cNvPr>
@@ -1858,7 +2068,7 @@
           <p:cNvPr id="6" name="Foliennummernplatzhalter 5">
             <a:extLst>
               <a:ext uri="{FF2B5EF4-FFF2-40B4-BE49-F238E27FC236}">
-                <a16:creationId xmlns:a16="http://schemas.microsoft.com/office/drawing/2014/main" xmlns="" id="{460C635F-5D16-422A-A061-5D5F7BD2F731}"/>
+                <a16:creationId xmlns="" xmlns:a16="http://schemas.microsoft.com/office/drawing/2014/main" id="{460C635F-5D16-422A-A061-5D5F7BD2F731}"/>
               </a:ext>
             </a:extLst>
           </p:cNvPr>
@@ -1924,7 +2134,7 @@
           <p:cNvPr id="2" name="Titel 1">
             <a:extLst>
               <a:ext uri="{FF2B5EF4-FFF2-40B4-BE49-F238E27FC236}">
-                <a16:creationId xmlns:a16="http://schemas.microsoft.com/office/drawing/2014/main" xmlns="" id="{3054A027-D034-4E51-A428-F46AEADE72DD}"/>
+                <a16:creationId xmlns="" xmlns:a16="http://schemas.microsoft.com/office/drawing/2014/main" id="{3054A027-D034-4E51-A428-F46AEADE72DD}"/>
               </a:ext>
             </a:extLst>
           </p:cNvPr>
@@ -1953,7 +2163,7 @@
           <p:cNvPr id="3" name="Vertikaler Textplatzhalter 2">
             <a:extLst>
               <a:ext uri="{FF2B5EF4-FFF2-40B4-BE49-F238E27FC236}">
-                <a16:creationId xmlns:a16="http://schemas.microsoft.com/office/drawing/2014/main" xmlns="" id="{E2566885-BF24-4763-808C-9A0673D76A71}"/>
+                <a16:creationId xmlns="" xmlns:a16="http://schemas.microsoft.com/office/drawing/2014/main" id="{E2566885-BF24-4763-808C-9A0673D76A71}"/>
               </a:ext>
             </a:extLst>
           </p:cNvPr>
@@ -2011,7 +2221,7 @@
           <p:cNvPr id="4" name="Datumsplatzhalter 3">
             <a:extLst>
               <a:ext uri="{FF2B5EF4-FFF2-40B4-BE49-F238E27FC236}">
-                <a16:creationId xmlns:a16="http://schemas.microsoft.com/office/drawing/2014/main" xmlns="" id="{F3556E77-B137-4221-B04C-91D7899B2970}"/>
+                <a16:creationId xmlns="" xmlns:a16="http://schemas.microsoft.com/office/drawing/2014/main" id="{F3556E77-B137-4221-B04C-91D7899B2970}"/>
               </a:ext>
             </a:extLst>
           </p:cNvPr>
@@ -2040,7 +2250,7 @@
           <p:cNvPr id="5" name="Fußzeilenplatzhalter 4">
             <a:extLst>
               <a:ext uri="{FF2B5EF4-FFF2-40B4-BE49-F238E27FC236}">
-                <a16:creationId xmlns:a16="http://schemas.microsoft.com/office/drawing/2014/main" xmlns="" id="{C9EDDC1A-09B6-4AAF-8A07-1BA88BC22E63}"/>
+                <a16:creationId xmlns="" xmlns:a16="http://schemas.microsoft.com/office/drawing/2014/main" id="{C9EDDC1A-09B6-4AAF-8A07-1BA88BC22E63}"/>
               </a:ext>
             </a:extLst>
           </p:cNvPr>
@@ -2065,7 +2275,7 @@
           <p:cNvPr id="6" name="Foliennummernplatzhalter 5">
             <a:extLst>
               <a:ext uri="{FF2B5EF4-FFF2-40B4-BE49-F238E27FC236}">
-                <a16:creationId xmlns:a16="http://schemas.microsoft.com/office/drawing/2014/main" xmlns="" id="{DF02CA30-9EC4-433F-9CDD-BC3229C85526}"/>
+                <a16:creationId xmlns="" xmlns:a16="http://schemas.microsoft.com/office/drawing/2014/main" id="{DF02CA30-9EC4-433F-9CDD-BC3229C85526}"/>
               </a:ext>
             </a:extLst>
           </p:cNvPr>
@@ -2131,7 +2341,7 @@
           <p:cNvPr id="2" name="Vertikaler Titel 1">
             <a:extLst>
               <a:ext uri="{FF2B5EF4-FFF2-40B4-BE49-F238E27FC236}">
-                <a16:creationId xmlns:a16="http://schemas.microsoft.com/office/drawing/2014/main" xmlns="" id="{B90751A0-FDBC-4E3B-968B-E41E0A0F7C46}"/>
+                <a16:creationId xmlns="" xmlns:a16="http://schemas.microsoft.com/office/drawing/2014/main" id="{B90751A0-FDBC-4E3B-968B-E41E0A0F7C46}"/>
               </a:ext>
             </a:extLst>
           </p:cNvPr>
@@ -2165,7 +2375,7 @@
           <p:cNvPr id="3" name="Vertikaler Textplatzhalter 2">
             <a:extLst>
               <a:ext uri="{FF2B5EF4-FFF2-40B4-BE49-F238E27FC236}">
-                <a16:creationId xmlns:a16="http://schemas.microsoft.com/office/drawing/2014/main" xmlns="" id="{0FB257EA-C29C-4755-8156-B2ADE3BE86B1}"/>
+                <a16:creationId xmlns="" xmlns:a16="http://schemas.microsoft.com/office/drawing/2014/main" id="{0FB257EA-C29C-4755-8156-B2ADE3BE86B1}"/>
               </a:ext>
             </a:extLst>
           </p:cNvPr>
@@ -2228,7 +2438,7 @@
           <p:cNvPr id="4" name="Datumsplatzhalter 3">
             <a:extLst>
               <a:ext uri="{FF2B5EF4-FFF2-40B4-BE49-F238E27FC236}">
-                <a16:creationId xmlns:a16="http://schemas.microsoft.com/office/drawing/2014/main" xmlns="" id="{1529C168-35F2-44FA-B110-C66C85764D40}"/>
+                <a16:creationId xmlns="" xmlns:a16="http://schemas.microsoft.com/office/drawing/2014/main" id="{1529C168-35F2-44FA-B110-C66C85764D40}"/>
               </a:ext>
             </a:extLst>
           </p:cNvPr>
@@ -2257,7 +2467,7 @@
           <p:cNvPr id="5" name="Fußzeilenplatzhalter 4">
             <a:extLst>
               <a:ext uri="{FF2B5EF4-FFF2-40B4-BE49-F238E27FC236}">
-                <a16:creationId xmlns:a16="http://schemas.microsoft.com/office/drawing/2014/main" xmlns="" id="{EF12ADA6-3C2A-4044-9E54-8127D1F88962}"/>
+                <a16:creationId xmlns="" xmlns:a16="http://schemas.microsoft.com/office/drawing/2014/main" id="{EF12ADA6-3C2A-4044-9E54-8127D1F88962}"/>
               </a:ext>
             </a:extLst>
           </p:cNvPr>
@@ -2282,7 +2492,7 @@
           <p:cNvPr id="6" name="Foliennummernplatzhalter 5">
             <a:extLst>
               <a:ext uri="{FF2B5EF4-FFF2-40B4-BE49-F238E27FC236}">
-                <a16:creationId xmlns:a16="http://schemas.microsoft.com/office/drawing/2014/main" xmlns="" id="{351A948C-9A4C-4FF5-9693-4E6F5D9933FA}"/>
+                <a16:creationId xmlns="" xmlns:a16="http://schemas.microsoft.com/office/drawing/2014/main" id="{351A948C-9A4C-4FF5-9693-4E6F5D9933FA}"/>
               </a:ext>
             </a:extLst>
           </p:cNvPr>
@@ -2348,7 +2558,7 @@
           <p:cNvPr id="2" name="Titel 1">
             <a:extLst>
               <a:ext uri="{FF2B5EF4-FFF2-40B4-BE49-F238E27FC236}">
-                <a16:creationId xmlns:a16="http://schemas.microsoft.com/office/drawing/2014/main" xmlns="" id="{D66002A1-2D6B-45BA-BDD4-11C64CCBCEF8}"/>
+                <a16:creationId xmlns="" xmlns:a16="http://schemas.microsoft.com/office/drawing/2014/main" id="{D66002A1-2D6B-45BA-BDD4-11C64CCBCEF8}"/>
               </a:ext>
             </a:extLst>
           </p:cNvPr>
@@ -2377,7 +2587,7 @@
           <p:cNvPr id="3" name="Inhaltsplatzhalter 2">
             <a:extLst>
               <a:ext uri="{FF2B5EF4-FFF2-40B4-BE49-F238E27FC236}">
-                <a16:creationId xmlns:a16="http://schemas.microsoft.com/office/drawing/2014/main" xmlns="" id="{04152BA4-842E-4B6A-9CAC-55AA8447F4C8}"/>
+                <a16:creationId xmlns="" xmlns:a16="http://schemas.microsoft.com/office/drawing/2014/main" id="{04152BA4-842E-4B6A-9CAC-55AA8447F4C8}"/>
               </a:ext>
             </a:extLst>
           </p:cNvPr>
@@ -2471,7 +2681,7 @@
           <p:cNvPr id="4" name="Datumsplatzhalter 3">
             <a:extLst>
               <a:ext uri="{FF2B5EF4-FFF2-40B4-BE49-F238E27FC236}">
-                <a16:creationId xmlns:a16="http://schemas.microsoft.com/office/drawing/2014/main" xmlns="" id="{C4EAD868-BAF6-4A65-BF92-0F4FBF1AD42F}"/>
+                <a16:creationId xmlns="" xmlns:a16="http://schemas.microsoft.com/office/drawing/2014/main" id="{C4EAD868-BAF6-4A65-BF92-0F4FBF1AD42F}"/>
               </a:ext>
             </a:extLst>
           </p:cNvPr>
@@ -2527,7 +2737,7 @@
           <p:cNvPr id="5" name="Fußzeilenplatzhalter 4">
             <a:extLst>
               <a:ext uri="{FF2B5EF4-FFF2-40B4-BE49-F238E27FC236}">
-                <a16:creationId xmlns:a16="http://schemas.microsoft.com/office/drawing/2014/main" xmlns="" id="{1FE4D665-7074-41E5-A113-F6026B5F537E}"/>
+                <a16:creationId xmlns="" xmlns:a16="http://schemas.microsoft.com/office/drawing/2014/main" id="{1FE4D665-7074-41E5-A113-F6026B5F537E}"/>
               </a:ext>
             </a:extLst>
           </p:cNvPr>
@@ -2564,7 +2774,7 @@
           <p:cNvPr id="6" name="Foliennummernplatzhalter 5">
             <a:extLst>
               <a:ext uri="{FF2B5EF4-FFF2-40B4-BE49-F238E27FC236}">
-                <a16:creationId xmlns:a16="http://schemas.microsoft.com/office/drawing/2014/main" xmlns="" id="{2FF1E68D-87AF-4291-B12C-0B532E334413}"/>
+                <a16:creationId xmlns="" xmlns:a16="http://schemas.microsoft.com/office/drawing/2014/main" id="{2FF1E68D-87AF-4291-B12C-0B532E334413}"/>
               </a:ext>
             </a:extLst>
           </p:cNvPr>
@@ -2643,7 +2853,7 @@
           <p:cNvPr id="2" name="Titel 1">
             <a:extLst>
               <a:ext uri="{FF2B5EF4-FFF2-40B4-BE49-F238E27FC236}">
-                <a16:creationId xmlns:a16="http://schemas.microsoft.com/office/drawing/2014/main" xmlns="" id="{81F86C0E-7DD2-46F3-AAED-E3EAE819E639}"/>
+                <a16:creationId xmlns="" xmlns:a16="http://schemas.microsoft.com/office/drawing/2014/main" id="{81F86C0E-7DD2-46F3-AAED-E3EAE819E639}"/>
               </a:ext>
             </a:extLst>
           </p:cNvPr>
@@ -2681,7 +2891,7 @@
           <p:cNvPr id="3" name="Textplatzhalter 2">
             <a:extLst>
               <a:ext uri="{FF2B5EF4-FFF2-40B4-BE49-F238E27FC236}">
-                <a16:creationId xmlns:a16="http://schemas.microsoft.com/office/drawing/2014/main" xmlns="" id="{ECEC2101-20A2-4821-A3F7-CF249A7509BA}"/>
+                <a16:creationId xmlns="" xmlns:a16="http://schemas.microsoft.com/office/drawing/2014/main" id="{ECEC2101-20A2-4821-A3F7-CF249A7509BA}"/>
               </a:ext>
             </a:extLst>
           </p:cNvPr>
@@ -2806,7 +3016,7 @@
           <p:cNvPr id="4" name="Datumsplatzhalter 3">
             <a:extLst>
               <a:ext uri="{FF2B5EF4-FFF2-40B4-BE49-F238E27FC236}">
-                <a16:creationId xmlns:a16="http://schemas.microsoft.com/office/drawing/2014/main" xmlns="" id="{26BA9AB4-2F2D-4EC5-9B4F-C6517440488C}"/>
+                <a16:creationId xmlns="" xmlns:a16="http://schemas.microsoft.com/office/drawing/2014/main" id="{26BA9AB4-2F2D-4EC5-9B4F-C6517440488C}"/>
               </a:ext>
             </a:extLst>
           </p:cNvPr>
@@ -2839,7 +3049,7 @@
           <p:cNvPr id="5" name="Fußzeilenplatzhalter 4">
             <a:extLst>
               <a:ext uri="{FF2B5EF4-FFF2-40B4-BE49-F238E27FC236}">
-                <a16:creationId xmlns:a16="http://schemas.microsoft.com/office/drawing/2014/main" xmlns="" id="{42F56A35-72E9-4F02-8164-BF9AD85C22C2}"/>
+                <a16:creationId xmlns="" xmlns:a16="http://schemas.microsoft.com/office/drawing/2014/main" id="{42F56A35-72E9-4F02-8164-BF9AD85C22C2}"/>
               </a:ext>
             </a:extLst>
           </p:cNvPr>
@@ -2868,7 +3078,7 @@
           <p:cNvPr id="6" name="Foliennummernplatzhalter 5">
             <a:extLst>
               <a:ext uri="{FF2B5EF4-FFF2-40B4-BE49-F238E27FC236}">
-                <a16:creationId xmlns:a16="http://schemas.microsoft.com/office/drawing/2014/main" xmlns="" id="{510A9E5A-0FF3-4123-B1A0-3F42F1796F04}"/>
+                <a16:creationId xmlns="" xmlns:a16="http://schemas.microsoft.com/office/drawing/2014/main" id="{510A9E5A-0FF3-4123-B1A0-3F42F1796F04}"/>
               </a:ext>
             </a:extLst>
           </p:cNvPr>
@@ -2943,7 +3153,7 @@
           <p:cNvPr id="2" name="Titel 1">
             <a:extLst>
               <a:ext uri="{FF2B5EF4-FFF2-40B4-BE49-F238E27FC236}">
-                <a16:creationId xmlns:a16="http://schemas.microsoft.com/office/drawing/2014/main" xmlns="" id="{4BB390FB-5C85-472B-B208-CDBDABD1DB5C}"/>
+                <a16:creationId xmlns="" xmlns:a16="http://schemas.microsoft.com/office/drawing/2014/main" id="{4BB390FB-5C85-472B-B208-CDBDABD1DB5C}"/>
               </a:ext>
             </a:extLst>
           </p:cNvPr>
@@ -2972,7 +3182,7 @@
           <p:cNvPr id="3" name="Inhaltsplatzhalter 2">
             <a:extLst>
               <a:ext uri="{FF2B5EF4-FFF2-40B4-BE49-F238E27FC236}">
-                <a16:creationId xmlns:a16="http://schemas.microsoft.com/office/drawing/2014/main" xmlns="" id="{40AA8914-DA53-46DC-BA8A-A2CDF7863D5C}"/>
+                <a16:creationId xmlns="" xmlns:a16="http://schemas.microsoft.com/office/drawing/2014/main" id="{40AA8914-DA53-46DC-BA8A-A2CDF7863D5C}"/>
               </a:ext>
             </a:extLst>
           </p:cNvPr>
@@ -3035,7 +3245,7 @@
           <p:cNvPr id="4" name="Inhaltsplatzhalter 3">
             <a:extLst>
               <a:ext uri="{FF2B5EF4-FFF2-40B4-BE49-F238E27FC236}">
-                <a16:creationId xmlns:a16="http://schemas.microsoft.com/office/drawing/2014/main" xmlns="" id="{CFDE11E3-9F3B-4BD5-A7BD-E91C93B89404}"/>
+                <a16:creationId xmlns="" xmlns:a16="http://schemas.microsoft.com/office/drawing/2014/main" id="{CFDE11E3-9F3B-4BD5-A7BD-E91C93B89404}"/>
               </a:ext>
             </a:extLst>
           </p:cNvPr>
@@ -3098,7 +3308,7 @@
           <p:cNvPr id="5" name="Datumsplatzhalter 4">
             <a:extLst>
               <a:ext uri="{FF2B5EF4-FFF2-40B4-BE49-F238E27FC236}">
-                <a16:creationId xmlns:a16="http://schemas.microsoft.com/office/drawing/2014/main" xmlns="" id="{88AC2D08-25C3-4922-88DF-261D72D67AD9}"/>
+                <a16:creationId xmlns="" xmlns:a16="http://schemas.microsoft.com/office/drawing/2014/main" id="{88AC2D08-25C3-4922-88DF-261D72D67AD9}"/>
               </a:ext>
             </a:extLst>
           </p:cNvPr>
@@ -3127,7 +3337,7 @@
           <p:cNvPr id="6" name="Fußzeilenplatzhalter 5">
             <a:extLst>
               <a:ext uri="{FF2B5EF4-FFF2-40B4-BE49-F238E27FC236}">
-                <a16:creationId xmlns:a16="http://schemas.microsoft.com/office/drawing/2014/main" xmlns="" id="{837C6BC8-8C88-49ED-BD19-BC60B836AE47}"/>
+                <a16:creationId xmlns="" xmlns:a16="http://schemas.microsoft.com/office/drawing/2014/main" id="{837C6BC8-8C88-49ED-BD19-BC60B836AE47}"/>
               </a:ext>
             </a:extLst>
           </p:cNvPr>
@@ -3152,7 +3362,7 @@
           <p:cNvPr id="7" name="Foliennummernplatzhalter 6">
             <a:extLst>
               <a:ext uri="{FF2B5EF4-FFF2-40B4-BE49-F238E27FC236}">
-                <a16:creationId xmlns:a16="http://schemas.microsoft.com/office/drawing/2014/main" xmlns="" id="{3DBF1D50-2F71-4A80-8D52-EC1DF51AF567}"/>
+                <a16:creationId xmlns="" xmlns:a16="http://schemas.microsoft.com/office/drawing/2014/main" id="{3DBF1D50-2F71-4A80-8D52-EC1DF51AF567}"/>
               </a:ext>
             </a:extLst>
           </p:cNvPr>
@@ -3218,7 +3428,7 @@
           <p:cNvPr id="2" name="Titel 1">
             <a:extLst>
               <a:ext uri="{FF2B5EF4-FFF2-40B4-BE49-F238E27FC236}">
-                <a16:creationId xmlns:a16="http://schemas.microsoft.com/office/drawing/2014/main" xmlns="" id="{8F3BA3FE-34CB-448F-9F53-E54D39C11513}"/>
+                <a16:creationId xmlns="" xmlns:a16="http://schemas.microsoft.com/office/drawing/2014/main" id="{8F3BA3FE-34CB-448F-9F53-E54D39C11513}"/>
               </a:ext>
             </a:extLst>
           </p:cNvPr>
@@ -3252,7 +3462,7 @@
           <p:cNvPr id="3" name="Textplatzhalter 2">
             <a:extLst>
               <a:ext uri="{FF2B5EF4-FFF2-40B4-BE49-F238E27FC236}">
-                <a16:creationId xmlns:a16="http://schemas.microsoft.com/office/drawing/2014/main" xmlns="" id="{89BB9AEA-2FC7-4E96-B6FF-95772CAF50E6}"/>
+                <a16:creationId xmlns="" xmlns:a16="http://schemas.microsoft.com/office/drawing/2014/main" id="{89BB9AEA-2FC7-4E96-B6FF-95772CAF50E6}"/>
               </a:ext>
             </a:extLst>
           </p:cNvPr>
@@ -3323,7 +3533,7 @@
           <p:cNvPr id="4" name="Inhaltsplatzhalter 3">
             <a:extLst>
               <a:ext uri="{FF2B5EF4-FFF2-40B4-BE49-F238E27FC236}">
-                <a16:creationId xmlns:a16="http://schemas.microsoft.com/office/drawing/2014/main" xmlns="" id="{BBC5D321-4752-4370-93A1-DA23822F113B}"/>
+                <a16:creationId xmlns="" xmlns:a16="http://schemas.microsoft.com/office/drawing/2014/main" id="{BBC5D321-4752-4370-93A1-DA23822F113B}"/>
               </a:ext>
             </a:extLst>
           </p:cNvPr>
@@ -3386,7 +3596,7 @@
           <p:cNvPr id="5" name="Textplatzhalter 4">
             <a:extLst>
               <a:ext uri="{FF2B5EF4-FFF2-40B4-BE49-F238E27FC236}">
-                <a16:creationId xmlns:a16="http://schemas.microsoft.com/office/drawing/2014/main" xmlns="" id="{C6F19701-D0DB-43BD-A889-218E0005BF9E}"/>
+                <a16:creationId xmlns="" xmlns:a16="http://schemas.microsoft.com/office/drawing/2014/main" id="{C6F19701-D0DB-43BD-A889-218E0005BF9E}"/>
               </a:ext>
             </a:extLst>
           </p:cNvPr>
@@ -3457,7 +3667,7 @@
           <p:cNvPr id="6" name="Inhaltsplatzhalter 5">
             <a:extLst>
               <a:ext uri="{FF2B5EF4-FFF2-40B4-BE49-F238E27FC236}">
-                <a16:creationId xmlns:a16="http://schemas.microsoft.com/office/drawing/2014/main" xmlns="" id="{8084A772-F8AC-47B4-AA2C-4D1CFA3326AB}"/>
+                <a16:creationId xmlns="" xmlns:a16="http://schemas.microsoft.com/office/drawing/2014/main" id="{8084A772-F8AC-47B4-AA2C-4D1CFA3326AB}"/>
               </a:ext>
             </a:extLst>
           </p:cNvPr>
@@ -3520,7 +3730,7 @@
           <p:cNvPr id="7" name="Datumsplatzhalter 6">
             <a:extLst>
               <a:ext uri="{FF2B5EF4-FFF2-40B4-BE49-F238E27FC236}">
-                <a16:creationId xmlns:a16="http://schemas.microsoft.com/office/drawing/2014/main" xmlns="" id="{51F9BBB0-BD5C-4C6C-810B-BF820848E354}"/>
+                <a16:creationId xmlns="" xmlns:a16="http://schemas.microsoft.com/office/drawing/2014/main" id="{51F9BBB0-BD5C-4C6C-810B-BF820848E354}"/>
               </a:ext>
             </a:extLst>
           </p:cNvPr>
@@ -3549,7 +3759,7 @@
           <p:cNvPr id="8" name="Fußzeilenplatzhalter 7">
             <a:extLst>
               <a:ext uri="{FF2B5EF4-FFF2-40B4-BE49-F238E27FC236}">
-                <a16:creationId xmlns:a16="http://schemas.microsoft.com/office/drawing/2014/main" xmlns="" id="{35D471B9-EC65-4005-8BD1-739CAD1FEA91}"/>
+                <a16:creationId xmlns="" xmlns:a16="http://schemas.microsoft.com/office/drawing/2014/main" id="{35D471B9-EC65-4005-8BD1-739CAD1FEA91}"/>
               </a:ext>
             </a:extLst>
           </p:cNvPr>
@@ -3574,7 +3784,7 @@
           <p:cNvPr id="9" name="Foliennummernplatzhalter 8">
             <a:extLst>
               <a:ext uri="{FF2B5EF4-FFF2-40B4-BE49-F238E27FC236}">
-                <a16:creationId xmlns:a16="http://schemas.microsoft.com/office/drawing/2014/main" xmlns="" id="{C649DE99-DB5F-4F8C-8C9A-4AB138F43E5A}"/>
+                <a16:creationId xmlns="" xmlns:a16="http://schemas.microsoft.com/office/drawing/2014/main" id="{C649DE99-DB5F-4F8C-8C9A-4AB138F43E5A}"/>
               </a:ext>
             </a:extLst>
           </p:cNvPr>
@@ -3640,7 +3850,7 @@
           <p:cNvPr id="2" name="Titel 1">
             <a:extLst>
               <a:ext uri="{FF2B5EF4-FFF2-40B4-BE49-F238E27FC236}">
-                <a16:creationId xmlns:a16="http://schemas.microsoft.com/office/drawing/2014/main" xmlns="" id="{94E8A92F-02D7-4603-B951-9E06BC99EFDB}"/>
+                <a16:creationId xmlns="" xmlns:a16="http://schemas.microsoft.com/office/drawing/2014/main" id="{94E8A92F-02D7-4603-B951-9E06BC99EFDB}"/>
               </a:ext>
             </a:extLst>
           </p:cNvPr>
@@ -3669,7 +3879,7 @@
           <p:cNvPr id="3" name="Datumsplatzhalter 2">
             <a:extLst>
               <a:ext uri="{FF2B5EF4-FFF2-40B4-BE49-F238E27FC236}">
-                <a16:creationId xmlns:a16="http://schemas.microsoft.com/office/drawing/2014/main" xmlns="" id="{A6E74591-252F-4719-A364-22A9AE1FB119}"/>
+                <a16:creationId xmlns="" xmlns:a16="http://schemas.microsoft.com/office/drawing/2014/main" id="{A6E74591-252F-4719-A364-22A9AE1FB119}"/>
               </a:ext>
             </a:extLst>
           </p:cNvPr>
@@ -3698,7 +3908,7 @@
           <p:cNvPr id="4" name="Fußzeilenplatzhalter 3">
             <a:extLst>
               <a:ext uri="{FF2B5EF4-FFF2-40B4-BE49-F238E27FC236}">
-                <a16:creationId xmlns:a16="http://schemas.microsoft.com/office/drawing/2014/main" xmlns="" id="{9CBC2608-0EB5-4E83-ACAA-2C276C010A5D}"/>
+                <a16:creationId xmlns="" xmlns:a16="http://schemas.microsoft.com/office/drawing/2014/main" id="{9CBC2608-0EB5-4E83-ACAA-2C276C010A5D}"/>
               </a:ext>
             </a:extLst>
           </p:cNvPr>
@@ -3723,7 +3933,7 @@
           <p:cNvPr id="5" name="Foliennummernplatzhalter 4">
             <a:extLst>
               <a:ext uri="{FF2B5EF4-FFF2-40B4-BE49-F238E27FC236}">
-                <a16:creationId xmlns:a16="http://schemas.microsoft.com/office/drawing/2014/main" xmlns="" id="{AFC79D39-D57F-442D-A164-7E5A97058820}"/>
+                <a16:creationId xmlns="" xmlns:a16="http://schemas.microsoft.com/office/drawing/2014/main" id="{AFC79D39-D57F-442D-A164-7E5A97058820}"/>
               </a:ext>
             </a:extLst>
           </p:cNvPr>
@@ -3789,7 +3999,7 @@
           <p:cNvPr id="2" name="Datumsplatzhalter 1">
             <a:extLst>
               <a:ext uri="{FF2B5EF4-FFF2-40B4-BE49-F238E27FC236}">
-                <a16:creationId xmlns:a16="http://schemas.microsoft.com/office/drawing/2014/main" xmlns="" id="{F6792193-51E9-4ACD-BAFF-4910719CE542}"/>
+                <a16:creationId xmlns="" xmlns:a16="http://schemas.microsoft.com/office/drawing/2014/main" id="{F6792193-51E9-4ACD-BAFF-4910719CE542}"/>
               </a:ext>
             </a:extLst>
           </p:cNvPr>
@@ -3818,7 +4028,7 @@
           <p:cNvPr id="3" name="Fußzeilenplatzhalter 2">
             <a:extLst>
               <a:ext uri="{FF2B5EF4-FFF2-40B4-BE49-F238E27FC236}">
-                <a16:creationId xmlns:a16="http://schemas.microsoft.com/office/drawing/2014/main" xmlns="" id="{4B13B5F8-F018-4BA7-9749-166984994231}"/>
+                <a16:creationId xmlns="" xmlns:a16="http://schemas.microsoft.com/office/drawing/2014/main" id="{4B13B5F8-F018-4BA7-9749-166984994231}"/>
               </a:ext>
             </a:extLst>
           </p:cNvPr>
@@ -3843,7 +4053,7 @@
           <p:cNvPr id="4" name="Foliennummernplatzhalter 3">
             <a:extLst>
               <a:ext uri="{FF2B5EF4-FFF2-40B4-BE49-F238E27FC236}">
-                <a16:creationId xmlns:a16="http://schemas.microsoft.com/office/drawing/2014/main" xmlns="" id="{BB120FF3-2BC1-4AC0-B2DC-58F688D05E0D}"/>
+                <a16:creationId xmlns="" xmlns:a16="http://schemas.microsoft.com/office/drawing/2014/main" id="{BB120FF3-2BC1-4AC0-B2DC-58F688D05E0D}"/>
               </a:ext>
             </a:extLst>
           </p:cNvPr>
@@ -3902,7 +4112,7 @@
           <p:cNvPr id="2" name="Titel 1">
             <a:extLst>
               <a:ext uri="{FF2B5EF4-FFF2-40B4-BE49-F238E27FC236}">
-                <a16:creationId xmlns:a16="http://schemas.microsoft.com/office/drawing/2014/main" xmlns="" id="{2D388B26-9960-4064-BDD3-73BC9B2B2E92}"/>
+                <a16:creationId xmlns="" xmlns:a16="http://schemas.microsoft.com/office/drawing/2014/main" id="{2D388B26-9960-4064-BDD3-73BC9B2B2E92}"/>
               </a:ext>
             </a:extLst>
           </p:cNvPr>
@@ -3940,7 +4150,7 @@
           <p:cNvPr id="3" name="Inhaltsplatzhalter 2">
             <a:extLst>
               <a:ext uri="{FF2B5EF4-FFF2-40B4-BE49-F238E27FC236}">
-                <a16:creationId xmlns:a16="http://schemas.microsoft.com/office/drawing/2014/main" xmlns="" id="{932F68AD-C766-4275-899D-A0F20C9C31ED}"/>
+                <a16:creationId xmlns="" xmlns:a16="http://schemas.microsoft.com/office/drawing/2014/main" id="{932F68AD-C766-4275-899D-A0F20C9C31ED}"/>
               </a:ext>
             </a:extLst>
           </p:cNvPr>
@@ -4031,7 +4241,7 @@
           <p:cNvPr id="4" name="Textplatzhalter 3">
             <a:extLst>
               <a:ext uri="{FF2B5EF4-FFF2-40B4-BE49-F238E27FC236}">
-                <a16:creationId xmlns:a16="http://schemas.microsoft.com/office/drawing/2014/main" xmlns="" id="{2108185C-AB4A-4E1D-B392-5E43ACF9C369}"/>
+                <a16:creationId xmlns="" xmlns:a16="http://schemas.microsoft.com/office/drawing/2014/main" id="{2108185C-AB4A-4E1D-B392-5E43ACF9C369}"/>
               </a:ext>
             </a:extLst>
           </p:cNvPr>
@@ -4102,7 +4312,7 @@
           <p:cNvPr id="5" name="Datumsplatzhalter 4">
             <a:extLst>
               <a:ext uri="{FF2B5EF4-FFF2-40B4-BE49-F238E27FC236}">
-                <a16:creationId xmlns:a16="http://schemas.microsoft.com/office/drawing/2014/main" xmlns="" id="{44D0C6E3-06E1-4E76-8352-8248A888E9B1}"/>
+                <a16:creationId xmlns="" xmlns:a16="http://schemas.microsoft.com/office/drawing/2014/main" id="{44D0C6E3-06E1-4E76-8352-8248A888E9B1}"/>
               </a:ext>
             </a:extLst>
           </p:cNvPr>
@@ -4131,7 +4341,7 @@
           <p:cNvPr id="6" name="Fußzeilenplatzhalter 5">
             <a:extLst>
               <a:ext uri="{FF2B5EF4-FFF2-40B4-BE49-F238E27FC236}">
-                <a16:creationId xmlns:a16="http://schemas.microsoft.com/office/drawing/2014/main" xmlns="" id="{DB9CAE24-044F-438A-BF7F-089689A4B2D9}"/>
+                <a16:creationId xmlns="" xmlns:a16="http://schemas.microsoft.com/office/drawing/2014/main" id="{DB9CAE24-044F-438A-BF7F-089689A4B2D9}"/>
               </a:ext>
             </a:extLst>
           </p:cNvPr>
@@ -4156,7 +4366,7 @@
           <p:cNvPr id="7" name="Foliennummernplatzhalter 6">
             <a:extLst>
               <a:ext uri="{FF2B5EF4-FFF2-40B4-BE49-F238E27FC236}">
-                <a16:creationId xmlns:a16="http://schemas.microsoft.com/office/drawing/2014/main" xmlns="" id="{3AB9384F-7A6B-4392-9D38-F8A0EEBD3884}"/>
+                <a16:creationId xmlns="" xmlns:a16="http://schemas.microsoft.com/office/drawing/2014/main" id="{3AB9384F-7A6B-4392-9D38-F8A0EEBD3884}"/>
               </a:ext>
             </a:extLst>
           </p:cNvPr>
@@ -4222,7 +4432,7 @@
           <p:cNvPr id="2" name="Titel 1">
             <a:extLst>
               <a:ext uri="{FF2B5EF4-FFF2-40B4-BE49-F238E27FC236}">
-                <a16:creationId xmlns:a16="http://schemas.microsoft.com/office/drawing/2014/main" xmlns="" id="{E3AD60DB-879E-4238-888B-FD1D62611D54}"/>
+                <a16:creationId xmlns="" xmlns:a16="http://schemas.microsoft.com/office/drawing/2014/main" id="{E3AD60DB-879E-4238-888B-FD1D62611D54}"/>
               </a:ext>
             </a:extLst>
           </p:cNvPr>
@@ -4260,7 +4470,7 @@
           <p:cNvPr id="3" name="Bildplatzhalter 2">
             <a:extLst>
               <a:ext uri="{FF2B5EF4-FFF2-40B4-BE49-F238E27FC236}">
-                <a16:creationId xmlns:a16="http://schemas.microsoft.com/office/drawing/2014/main" xmlns="" id="{F1A68723-41A7-4887-A973-0678E815FCA7}"/>
+                <a16:creationId xmlns="" xmlns:a16="http://schemas.microsoft.com/office/drawing/2014/main" id="{F1A68723-41A7-4887-A973-0678E815FCA7}"/>
               </a:ext>
             </a:extLst>
           </p:cNvPr>
@@ -4327,7 +4537,7 @@
           <p:cNvPr id="4" name="Textplatzhalter 3">
             <a:extLst>
               <a:ext uri="{FF2B5EF4-FFF2-40B4-BE49-F238E27FC236}">
-                <a16:creationId xmlns:a16="http://schemas.microsoft.com/office/drawing/2014/main" xmlns="" id="{C8FD5C32-8C51-4C68-9E35-5A89AD7BB98E}"/>
+                <a16:creationId xmlns="" xmlns:a16="http://schemas.microsoft.com/office/drawing/2014/main" id="{C8FD5C32-8C51-4C68-9E35-5A89AD7BB98E}"/>
               </a:ext>
             </a:extLst>
           </p:cNvPr>
@@ -4398,7 +4608,7 @@
           <p:cNvPr id="5" name="Datumsplatzhalter 4">
             <a:extLst>
               <a:ext uri="{FF2B5EF4-FFF2-40B4-BE49-F238E27FC236}">
-                <a16:creationId xmlns:a16="http://schemas.microsoft.com/office/drawing/2014/main" xmlns="" id="{7839CE6D-0A8A-4B3D-A33D-9FEA28EE7076}"/>
+                <a16:creationId xmlns="" xmlns:a16="http://schemas.microsoft.com/office/drawing/2014/main" id="{7839CE6D-0A8A-4B3D-A33D-9FEA28EE7076}"/>
               </a:ext>
             </a:extLst>
           </p:cNvPr>
@@ -4427,7 +4637,7 @@
           <p:cNvPr id="6" name="Fußzeilenplatzhalter 5">
             <a:extLst>
               <a:ext uri="{FF2B5EF4-FFF2-40B4-BE49-F238E27FC236}">
-                <a16:creationId xmlns:a16="http://schemas.microsoft.com/office/drawing/2014/main" xmlns="" id="{CD7F9BB1-7823-41B1-BFC5-49514AE18CC4}"/>
+                <a16:creationId xmlns="" xmlns:a16="http://schemas.microsoft.com/office/drawing/2014/main" id="{CD7F9BB1-7823-41B1-BFC5-49514AE18CC4}"/>
               </a:ext>
             </a:extLst>
           </p:cNvPr>
@@ -4452,7 +4662,7 @@
           <p:cNvPr id="7" name="Foliennummernplatzhalter 6">
             <a:extLst>
               <a:ext uri="{FF2B5EF4-FFF2-40B4-BE49-F238E27FC236}">
-                <a16:creationId xmlns:a16="http://schemas.microsoft.com/office/drawing/2014/main" xmlns="" id="{F18D3FA9-926C-4EC6-A578-2A5E218FA1E9}"/>
+                <a16:creationId xmlns="" xmlns:a16="http://schemas.microsoft.com/office/drawing/2014/main" id="{F18D3FA9-926C-4EC6-A578-2A5E218FA1E9}"/>
               </a:ext>
             </a:extLst>
           </p:cNvPr>
@@ -4530,7 +4740,7 @@
           <p:cNvPr id="2" name="Titelplatzhalter 1">
             <a:extLst>
               <a:ext uri="{FF2B5EF4-FFF2-40B4-BE49-F238E27FC236}">
-                <a16:creationId xmlns:a16="http://schemas.microsoft.com/office/drawing/2014/main" xmlns="" id="{E913FAB9-8915-46C7-8CEA-E6754C9E2E1E}"/>
+                <a16:creationId xmlns="" xmlns:a16="http://schemas.microsoft.com/office/drawing/2014/main" id="{E913FAB9-8915-46C7-8CEA-E6754C9E2E1E}"/>
               </a:ext>
             </a:extLst>
           </p:cNvPr>
@@ -4569,7 +4779,7 @@
           <p:cNvPr id="3" name="Textplatzhalter 2">
             <a:extLst>
               <a:ext uri="{FF2B5EF4-FFF2-40B4-BE49-F238E27FC236}">
-                <a16:creationId xmlns:a16="http://schemas.microsoft.com/office/drawing/2014/main" xmlns="" id="{C369804F-D772-4354-B75F-D2ED451CB93E}"/>
+                <a16:creationId xmlns="" xmlns:a16="http://schemas.microsoft.com/office/drawing/2014/main" id="{C369804F-D772-4354-B75F-D2ED451CB93E}"/>
               </a:ext>
             </a:extLst>
           </p:cNvPr>
@@ -4637,7 +4847,7 @@
           <p:cNvPr id="4" name="Datumsplatzhalter 3">
             <a:extLst>
               <a:ext uri="{FF2B5EF4-FFF2-40B4-BE49-F238E27FC236}">
-                <a16:creationId xmlns:a16="http://schemas.microsoft.com/office/drawing/2014/main" xmlns="" id="{868A138B-A15C-4683-B1E2-853F51C78A99}"/>
+                <a16:creationId xmlns="" xmlns:a16="http://schemas.microsoft.com/office/drawing/2014/main" id="{868A138B-A15C-4683-B1E2-853F51C78A99}"/>
               </a:ext>
             </a:extLst>
           </p:cNvPr>
@@ -4684,7 +4894,7 @@
           <p:cNvPr id="5" name="Fußzeilenplatzhalter 4">
             <a:extLst>
               <a:ext uri="{FF2B5EF4-FFF2-40B4-BE49-F238E27FC236}">
-                <a16:creationId xmlns:a16="http://schemas.microsoft.com/office/drawing/2014/main" xmlns="" id="{94A21690-13DE-4C8A-8988-132C6ACEA4EE}"/>
+                <a16:creationId xmlns="" xmlns:a16="http://schemas.microsoft.com/office/drawing/2014/main" id="{94A21690-13DE-4C8A-8988-132C6ACEA4EE}"/>
               </a:ext>
             </a:extLst>
           </p:cNvPr>
@@ -4731,7 +4941,7 @@
           <p:cNvPr id="6" name="Foliennummernplatzhalter 5">
             <a:extLst>
               <a:ext uri="{FF2B5EF4-FFF2-40B4-BE49-F238E27FC236}">
-                <a16:creationId xmlns:a16="http://schemas.microsoft.com/office/drawing/2014/main" xmlns="" id="{5BCDBF9D-A154-4C5E-A102-587F7D5F0A89}"/>
+                <a16:creationId xmlns="" xmlns:a16="http://schemas.microsoft.com/office/drawing/2014/main" id="{5BCDBF9D-A154-4C5E-A102-587F7D5F0A89}"/>
               </a:ext>
             </a:extLst>
           </p:cNvPr>
@@ -5111,7 +5321,7 @@
           <p:nvPr/>
         </p:nvPicPr>
         <p:blipFill>
-          <a:blip r:embed="rId2">
+          <a:blip r:embed="rId3">
             <a:extLst>
               <a:ext uri="{28A0092B-C50C-407E-A947-70E740481C1C}">
                 <a14:useLocalDpi xmlns:a14="http://schemas.microsoft.com/office/drawing/2010/main" val="0"/>
@@ -5238,11 +5448,6 @@
               </a:rPr>
               <a:t>Zeitplan</a:t>
             </a:r>
-            <a:endParaRPr lang="de-CH" sz="3200" dirty="0">
-              <a:solidFill>
-                <a:srgbClr val="7F6E5D"/>
-              </a:solidFill>
-            </a:endParaRPr>
           </a:p>
         </p:txBody>
       </p:sp>
@@ -5310,7 +5515,6 @@
               <a:rPr lang="de-CH" dirty="0"/>
               <a:t>© GRÖNDOM Inc. 2017</a:t>
             </a:r>
-            <a:endParaRPr lang="de-CH" dirty="0"/>
           </a:p>
         </p:txBody>
       </p:sp>
@@ -5514,7 +5718,6 @@
               <a:rPr lang="de-CH" dirty="0"/>
               <a:t>© GRÖNDOM Inc. 2017</a:t>
             </a:r>
-            <a:endParaRPr lang="de-CH" dirty="0"/>
           </a:p>
         </p:txBody>
       </p:sp>
@@ -5612,7 +5815,6 @@
               <a:rPr lang="de-CH" dirty="0"/>
               <a:t>© GRÖNDOM Inc. 2017</a:t>
             </a:r>
-            <a:endParaRPr lang="de-CH" dirty="0"/>
           </a:p>
         </p:txBody>
       </p:sp>
@@ -5737,7 +5939,6 @@
               <a:rPr lang="de-CH" dirty="0"/>
               <a:t>© GRÖNDOM Inc. 2017</a:t>
             </a:r>
-            <a:endParaRPr lang="de-CH" dirty="0"/>
           </a:p>
         </p:txBody>
       </p:sp>
@@ -5820,7 +6021,7 @@
               <a:rPr lang="de-DE" dirty="0"/>
             </a:br>
             <a:r>
-              <a:rPr lang="de-CH" sz="3200" dirty="0" err="1" smtClean="0">
+              <a:rPr lang="de-CH" sz="3200" dirty="0" err="1">
                 <a:solidFill>
                   <a:srgbClr val="7F6E5D"/>
                 </a:solidFill>
@@ -5828,18 +6029,13 @@
               <a:t>Continous</a:t>
             </a:r>
             <a:r>
-              <a:rPr lang="de-CH" sz="3200" dirty="0" smtClean="0">
+              <a:rPr lang="de-CH" sz="3200" dirty="0">
                 <a:solidFill>
                   <a:srgbClr val="7F6E5D"/>
                 </a:solidFill>
               </a:rPr>
               <a:t> Integration</a:t>
             </a:r>
-            <a:endParaRPr lang="de-CH" sz="3200" dirty="0">
-              <a:solidFill>
-                <a:srgbClr val="7F6E5D"/>
-              </a:solidFill>
-            </a:endParaRPr>
           </a:p>
         </p:txBody>
       </p:sp>
@@ -5862,7 +6058,6 @@
               <a:rPr lang="de-CH" dirty="0"/>
               <a:t>© GRÖNDOM Inc. 2017</a:t>
             </a:r>
-            <a:endParaRPr lang="de-CH" dirty="0"/>
           </a:p>
         </p:txBody>
       </p:sp>
@@ -5876,32 +6071,106 @@
             <p:ph idx="1"/>
           </p:nvPr>
         </p:nvSpPr>
-        <p:spPr/>
-        <p:txBody>
-          <a:bodyPr/>
-          <a:lstStyle/>
-          <a:p>
-            <a:endParaRPr lang="de-DE"/>
-          </a:p>
-        </p:txBody>
-      </p:sp>
+        <p:spPr>
+          <a:xfrm>
+            <a:off x="838200" y="1825625"/>
+            <a:ext cx="4790440" cy="4351338"/>
+          </a:xfrm>
+        </p:spPr>
+        <p:txBody>
+          <a:bodyPr/>
+          <a:lstStyle/>
+          <a:p>
+            <a:r>
+              <a:rPr lang="de-DE" dirty="0"/>
+              <a:t>Travis CI</a:t>
+            </a:r>
+          </a:p>
+          <a:p>
+            <a:r>
+              <a:rPr lang="de-DE" dirty="0"/>
+              <a:t>Kaum Anleitungen</a:t>
+            </a:r>
+          </a:p>
+          <a:p>
+            <a:r>
+              <a:rPr lang="de-DE" dirty="0"/>
+              <a:t>Probleme mit Android</a:t>
+            </a:r>
+          </a:p>
+          <a:p>
+            <a:pPr lvl="1"/>
+            <a:r>
+              <a:rPr lang="de-DE" dirty="0"/>
+              <a:t>Lizenzen</a:t>
+            </a:r>
+          </a:p>
+          <a:p>
+            <a:pPr lvl="1"/>
+            <a:r>
+              <a:rPr lang="de-DE" dirty="0"/>
+              <a:t>Emulator</a:t>
+            </a:r>
+          </a:p>
+        </p:txBody>
+      </p:sp>
+      <p:pic>
+        <p:nvPicPr>
+          <p:cNvPr id="1026" name="Picture 2" descr="Bildergebnis für travis ci">
+            <a:extLst>
+              <a:ext uri="{FF2B5EF4-FFF2-40B4-BE49-F238E27FC236}">
+                <a16:creationId xmlns:a16="http://schemas.microsoft.com/office/drawing/2014/main" xmlns="" id="{53200BA7-4533-42F2-B388-B9525402E074}"/>
+              </a:ext>
+            </a:extLst>
+          </p:cNvPr>
+          <p:cNvPicPr>
+            <a:picLocks noChangeAspect="1" noChangeArrowheads="1"/>
+          </p:cNvPicPr>
+          <p:nvPr/>
+        </p:nvPicPr>
+        <p:blipFill>
+          <a:blip r:embed="rId3">
+            <a:extLst>
+              <a:ext uri="{28A0092B-C50C-407E-A947-70E740481C1C}">
+                <a14:useLocalDpi xmlns:a14="http://schemas.microsoft.com/office/drawing/2010/main" val="0"/>
+              </a:ext>
+            </a:extLst>
+          </a:blip>
+          <a:srcRect/>
+          <a:stretch>
+            <a:fillRect/>
+          </a:stretch>
+        </p:blipFill>
+        <p:spPr bwMode="auto">
+          <a:xfrm>
+            <a:off x="8752789" y="365125"/>
+            <a:ext cx="2909303" cy="2886075"/>
+          </a:xfrm>
+          <a:prstGeom prst="rect">
+            <a:avLst/>
+          </a:prstGeom>
+          <a:noFill/>
+          <a:extLst>
+            <a:ext uri="{909E8E84-426E-40DD-AFC4-6F175D3DCCD1}">
+              <a14:hiddenFill xmlns:a14="http://schemas.microsoft.com/office/drawing/2010/main">
+                <a:solidFill>
+                  <a:srgbClr val="FFFFFF"/>
+                </a:solidFill>
+              </a14:hiddenFill>
+            </a:ext>
+          </a:extLst>
+        </p:spPr>
+      </p:pic>
     </p:spTree>
     <p:extLst>
       <p:ext uri="{BB962C8B-B14F-4D97-AF65-F5344CB8AC3E}">
-        <p14:creationId xmlns:p14="http://schemas.microsoft.com/office/powerpoint/2010/main" val="392014102"/>
+        <p14:creationId xmlns:p14="http://schemas.microsoft.com/office/powerpoint/2010/main" val="783601852"/>
       </p:ext>
     </p:extLst>
   </p:cSld>
   <p:clrMapOvr>
     <a:masterClrMapping/>
   </p:clrMapOvr>
-  <p:timing>
-    <p:tnLst>
-      <p:par>
-        <p:cTn id="1" dur="indefinite" restart="never" nodeType="tmRoot"/>
-      </p:par>
-    </p:tnLst>
-  </p:timing>
 </p:sld>
 </file>
 
@@ -5974,7 +6243,6 @@
               <a:rPr lang="de-CH" dirty="0"/>
               <a:t>© GRÖNDOM Inc. 2017</a:t>
             </a:r>
-            <a:endParaRPr lang="de-CH" dirty="0"/>
           </a:p>
         </p:txBody>
       </p:sp>
@@ -6125,10 +6393,6 @@
               <a:rPr lang="de-DE" dirty="0" smtClean="0"/>
               <a:t>Beurteilungsraster</a:t>
             </a:r>
-            <a:r>
-              <a:rPr lang="de-DE" dirty="0" smtClean="0"/>
-              <a:t/>
-            </a:r>
             <a:br>
               <a:rPr lang="de-DE" dirty="0" smtClean="0"/>
             </a:br>
@@ -6167,7 +6431,6 @@
               <a:rPr lang="de-CH" dirty="0"/>
               <a:t>© GRÖNDOM Inc. 2017</a:t>
             </a:r>
-            <a:endParaRPr lang="de-CH" dirty="0"/>
           </a:p>
         </p:txBody>
       </p:sp>
@@ -6379,7 +6642,6 @@
               <a:rPr lang="de-CH" dirty="0"/>
               <a:t>© GRÖNDOM Inc. 2017</a:t>
             </a:r>
-            <a:endParaRPr lang="de-CH" dirty="0"/>
           </a:p>
         </p:txBody>
       </p:sp>
@@ -6425,7 +6687,7 @@
           <p:cNvPr id="3" name="Titel 1">
             <a:extLst>
               <a:ext uri="{FF2B5EF4-FFF2-40B4-BE49-F238E27FC236}">
-                <a16:creationId xmlns:a16="http://schemas.microsoft.com/office/drawing/2014/main" xmlns="" id="{A58C54B0-51EF-49FB-B596-6A65DFA4E4A0}"/>
+                <a16:creationId xmlns="" xmlns:a16="http://schemas.microsoft.com/office/drawing/2014/main" id="{A58C54B0-51EF-49FB-B596-6A65DFA4E4A0}"/>
               </a:ext>
             </a:extLst>
           </p:cNvPr>
@@ -6656,7 +6918,6 @@
               <a:rPr lang="de-CH" dirty="0"/>
               <a:t>© GRÖNDOM Inc. 2017</a:t>
             </a:r>
-            <a:endParaRPr lang="de-CH" dirty="0"/>
           </a:p>
         </p:txBody>
       </p:sp>
@@ -6804,7 +7065,6 @@
               <a:rPr lang="de-CH" dirty="0"/>
               <a:t>© GRÖNDOM Inc. 2017</a:t>
             </a:r>
-            <a:endParaRPr lang="de-CH" dirty="0"/>
           </a:p>
         </p:txBody>
       </p:sp>
@@ -6943,7 +7203,6 @@
               <a:rPr lang="de-CH" dirty="0"/>
               <a:t>© GRÖNDOM Inc. 2017</a:t>
             </a:r>
-            <a:endParaRPr lang="de-CH" dirty="0"/>
           </a:p>
         </p:txBody>
       </p:sp>
@@ -7080,7 +7339,6 @@
               <a:rPr lang="de-CH" dirty="0"/>
               <a:t>© GRÖNDOM Inc. 2017</a:t>
             </a:r>
-            <a:endParaRPr lang="de-CH" dirty="0"/>
           </a:p>
         </p:txBody>
       </p:sp>
@@ -7173,7 +7431,6 @@
               <a:rPr lang="de-CH" dirty="0"/>
               <a:t>© GRÖNDOM Inc. 2017</a:t>
             </a:r>
-            <a:endParaRPr lang="de-CH" dirty="0"/>
           </a:p>
         </p:txBody>
       </p:sp>
@@ -7330,7 +7587,6 @@
               <a:rPr lang="de-DE" dirty="0" smtClean="0"/>
               <a:t>SCRUM</a:t>
             </a:r>
-            <a:endParaRPr lang="de-DE" dirty="0" smtClean="0"/>
           </a:p>
           <a:p>
             <a:r>
@@ -7388,7 +7644,6 @@
               <a:rPr lang="de-CH" dirty="0"/>
               <a:t>© GRÖNDOM Inc. 2017</a:t>
             </a:r>
-            <a:endParaRPr lang="de-CH" dirty="0"/>
           </a:p>
         </p:txBody>
       </p:sp>
@@ -7562,7 +7817,6 @@
               <a:rPr lang="de-CH" dirty="0"/>
               <a:t>© GRÖNDOM Inc. 2017</a:t>
             </a:r>
-            <a:endParaRPr lang="de-CH" dirty="0"/>
           </a:p>
         </p:txBody>
       </p:sp>
@@ -7763,7 +8017,6 @@
               <a:rPr lang="de-CH" dirty="0"/>
               <a:t>© GRÖNDOM Inc. 2017</a:t>
             </a:r>
-            <a:endParaRPr lang="de-CH" dirty="0"/>
           </a:p>
         </p:txBody>
       </p:sp>

</xml_diff>